<commit_message>
Add buttons to the app
</commit_message>
<xml_diff>
--- a/ui_random_quote.pptx
+++ b/ui_random_quote.pptx
@@ -6,6 +6,8 @@
   </p:sldMasterIdLst>
   <p:sldIdLst>
     <p:sldId id="256" r:id="rId2"/>
+    <p:sldId id="257" r:id="rId3"/>
+    <p:sldId id="258" r:id="rId4"/>
   </p:sldIdLst>
   <p:sldSz cx="12192000" cy="6858000"/>
   <p:notesSz cx="6858000" cy="9144000"/>
@@ -3321,10 +3323,588 @@
           <a:chExt cx="0" cy="0"/>
         </a:xfrm>
       </p:grpSpPr>
+      <p:sp>
+        <p:nvSpPr>
+          <p:cNvPr id="4" name="Rectangle 3">
+            <a:extLst>
+              <a:ext uri="{FF2B5EF4-FFF2-40B4-BE49-F238E27FC236}">
+                <a16:creationId xmlns:a16="http://schemas.microsoft.com/office/drawing/2014/main" id="{76939878-1409-4C7D-9512-E9457BFB59D3}"/>
+              </a:ext>
+            </a:extLst>
+          </p:cNvPr>
+          <p:cNvSpPr/>
+          <p:nvPr/>
+        </p:nvSpPr>
+        <p:spPr>
+          <a:xfrm>
+            <a:off x="885040" y="812257"/>
+            <a:ext cx="10578089" cy="5389760"/>
+          </a:xfrm>
+          <a:prstGeom prst="rect">
+            <a:avLst/>
+          </a:prstGeom>
+        </p:spPr>
+        <p:style>
+          <a:lnRef idx="2">
+            <a:schemeClr val="accent1">
+              <a:shade val="50000"/>
+            </a:schemeClr>
+          </a:lnRef>
+          <a:fillRef idx="1">
+            <a:schemeClr val="accent1"/>
+          </a:fillRef>
+          <a:effectRef idx="0">
+            <a:schemeClr val="accent1"/>
+          </a:effectRef>
+          <a:fontRef idx="minor">
+            <a:schemeClr val="lt1"/>
+          </a:fontRef>
+        </p:style>
+        <p:txBody>
+          <a:bodyPr rtlCol="0" anchor="ctr"/>
+          <a:lstStyle/>
+          <a:p>
+            <a:pPr algn="ctr"/>
+            <a:r>
+              <a:rPr lang="en-US" dirty="0"/>
+              <a:t>App</a:t>
+            </a:r>
+          </a:p>
+        </p:txBody>
+      </p:sp>
     </p:spTree>
     <p:extLst>
       <p:ext uri="{BB962C8B-B14F-4D97-AF65-F5344CB8AC3E}">
         <p14:creationId xmlns:p14="http://schemas.microsoft.com/office/powerpoint/2010/main" val="1788225384"/>
+      </p:ext>
+    </p:extLst>
+  </p:cSld>
+  <p:clrMapOvr>
+    <a:masterClrMapping/>
+  </p:clrMapOvr>
+</p:sld>
+</file>
+
+<file path=ppt/slides/slide2.xml><?xml version="1.0" encoding="utf-8"?>
+<p:sld xmlns:a="http://schemas.openxmlformats.org/drawingml/2006/main" xmlns:r="http://schemas.openxmlformats.org/officeDocument/2006/relationships" xmlns:p="http://schemas.openxmlformats.org/presentationml/2006/main">
+  <p:cSld>
+    <p:spTree>
+      <p:nvGrpSpPr>
+        <p:cNvPr id="1" name=""/>
+        <p:cNvGrpSpPr/>
+        <p:nvPr/>
+      </p:nvGrpSpPr>
+      <p:grpSpPr>
+        <a:xfrm>
+          <a:off x="0" y="0"/>
+          <a:ext cx="0" cy="0"/>
+          <a:chOff x="0" y="0"/>
+          <a:chExt cx="0" cy="0"/>
+        </a:xfrm>
+      </p:grpSpPr>
+      <p:sp>
+        <p:nvSpPr>
+          <p:cNvPr id="4" name="Rectangle 3">
+            <a:extLst>
+              <a:ext uri="{FF2B5EF4-FFF2-40B4-BE49-F238E27FC236}">
+                <a16:creationId xmlns:a16="http://schemas.microsoft.com/office/drawing/2014/main" id="{76939878-1409-4C7D-9512-E9457BFB59D3}"/>
+              </a:ext>
+            </a:extLst>
+          </p:cNvPr>
+          <p:cNvSpPr/>
+          <p:nvPr/>
+        </p:nvSpPr>
+        <p:spPr>
+          <a:xfrm>
+            <a:off x="885040" y="812257"/>
+            <a:ext cx="10578089" cy="5389760"/>
+          </a:xfrm>
+          <a:prstGeom prst="rect">
+            <a:avLst/>
+          </a:prstGeom>
+        </p:spPr>
+        <p:style>
+          <a:lnRef idx="2">
+            <a:schemeClr val="accent1">
+              <a:shade val="50000"/>
+            </a:schemeClr>
+          </a:lnRef>
+          <a:fillRef idx="1">
+            <a:schemeClr val="accent1"/>
+          </a:fillRef>
+          <a:effectRef idx="0">
+            <a:schemeClr val="accent1"/>
+          </a:effectRef>
+          <a:fontRef idx="minor">
+            <a:schemeClr val="lt1"/>
+          </a:fontRef>
+        </p:style>
+        <p:txBody>
+          <a:bodyPr rtlCol="0" anchor="ctr"/>
+          <a:lstStyle/>
+          <a:p>
+            <a:pPr algn="ctr"/>
+            <a:r>
+              <a:rPr lang="en-US" dirty="0"/>
+              <a:t>App</a:t>
+            </a:r>
+          </a:p>
+        </p:txBody>
+      </p:sp>
+      <p:sp>
+        <p:nvSpPr>
+          <p:cNvPr id="2" name="Rectangle 1">
+            <a:extLst>
+              <a:ext uri="{FF2B5EF4-FFF2-40B4-BE49-F238E27FC236}">
+                <a16:creationId xmlns:a16="http://schemas.microsoft.com/office/drawing/2014/main" id="{A00D6C60-AE87-4EE9-A4CE-124E3820F296}"/>
+              </a:ext>
+            </a:extLst>
+          </p:cNvPr>
+          <p:cNvSpPr/>
+          <p:nvPr/>
+        </p:nvSpPr>
+        <p:spPr>
+          <a:xfrm>
+            <a:off x="1351722" y="1232452"/>
+            <a:ext cx="9687339" cy="4492487"/>
+          </a:xfrm>
+          <a:prstGeom prst="rect">
+            <a:avLst/>
+          </a:prstGeom>
+          <a:solidFill>
+            <a:schemeClr val="accent2"/>
+          </a:solidFill>
+        </p:spPr>
+        <p:style>
+          <a:lnRef idx="2">
+            <a:schemeClr val="accent1">
+              <a:shade val="50000"/>
+            </a:schemeClr>
+          </a:lnRef>
+          <a:fillRef idx="1">
+            <a:schemeClr val="accent1"/>
+          </a:fillRef>
+          <a:effectRef idx="0">
+            <a:schemeClr val="accent1"/>
+          </a:effectRef>
+          <a:fontRef idx="minor">
+            <a:schemeClr val="lt1"/>
+          </a:fontRef>
+        </p:style>
+        <p:txBody>
+          <a:bodyPr rtlCol="0" anchor="ctr"/>
+          <a:lstStyle/>
+          <a:p>
+            <a:pPr algn="ctr"/>
+            <a:r>
+              <a:rPr lang="en-US" dirty="0" err="1"/>
+              <a:t>RandomQuoteMachine</a:t>
+            </a:r>
+            <a:endParaRPr lang="en-US" dirty="0"/>
+          </a:p>
+        </p:txBody>
+      </p:sp>
+    </p:spTree>
+    <p:extLst>
+      <p:ext uri="{BB962C8B-B14F-4D97-AF65-F5344CB8AC3E}">
+        <p14:creationId xmlns:p14="http://schemas.microsoft.com/office/powerpoint/2010/main" val="2983703610"/>
+      </p:ext>
+    </p:extLst>
+  </p:cSld>
+  <p:clrMapOvr>
+    <a:masterClrMapping/>
+  </p:clrMapOvr>
+</p:sld>
+</file>
+
+<file path=ppt/slides/slide3.xml><?xml version="1.0" encoding="utf-8"?>
+<p:sld xmlns:a="http://schemas.openxmlformats.org/drawingml/2006/main" xmlns:r="http://schemas.openxmlformats.org/officeDocument/2006/relationships" xmlns:p="http://schemas.openxmlformats.org/presentationml/2006/main">
+  <p:cSld>
+    <p:spTree>
+      <p:nvGrpSpPr>
+        <p:cNvPr id="1" name=""/>
+        <p:cNvGrpSpPr/>
+        <p:nvPr/>
+      </p:nvGrpSpPr>
+      <p:grpSpPr>
+        <a:xfrm>
+          <a:off x="0" y="0"/>
+          <a:ext cx="0" cy="0"/>
+          <a:chOff x="0" y="0"/>
+          <a:chExt cx="0" cy="0"/>
+        </a:xfrm>
+      </p:grpSpPr>
+      <p:sp>
+        <p:nvSpPr>
+          <p:cNvPr id="4" name="Rectangle 3">
+            <a:extLst>
+              <a:ext uri="{FF2B5EF4-FFF2-40B4-BE49-F238E27FC236}">
+                <a16:creationId xmlns:a16="http://schemas.microsoft.com/office/drawing/2014/main" id="{76939878-1409-4C7D-9512-E9457BFB59D3}"/>
+              </a:ext>
+            </a:extLst>
+          </p:cNvPr>
+          <p:cNvSpPr/>
+          <p:nvPr/>
+        </p:nvSpPr>
+        <p:spPr>
+          <a:xfrm>
+            <a:off x="885040" y="812257"/>
+            <a:ext cx="10578089" cy="5389760"/>
+          </a:xfrm>
+          <a:prstGeom prst="rect">
+            <a:avLst/>
+          </a:prstGeom>
+        </p:spPr>
+        <p:style>
+          <a:lnRef idx="2">
+            <a:schemeClr val="accent1">
+              <a:shade val="50000"/>
+            </a:schemeClr>
+          </a:lnRef>
+          <a:fillRef idx="1">
+            <a:schemeClr val="accent1"/>
+          </a:fillRef>
+          <a:effectRef idx="0">
+            <a:schemeClr val="accent1"/>
+          </a:effectRef>
+          <a:fontRef idx="minor">
+            <a:schemeClr val="lt1"/>
+          </a:fontRef>
+        </p:style>
+        <p:txBody>
+          <a:bodyPr rtlCol="0" anchor="ctr"/>
+          <a:lstStyle/>
+          <a:p>
+            <a:pPr algn="ctr"/>
+            <a:r>
+              <a:rPr lang="en-US" dirty="0"/>
+              <a:t>App</a:t>
+            </a:r>
+          </a:p>
+        </p:txBody>
+      </p:sp>
+      <p:sp>
+        <p:nvSpPr>
+          <p:cNvPr id="2" name="Rectangle 1">
+            <a:extLst>
+              <a:ext uri="{FF2B5EF4-FFF2-40B4-BE49-F238E27FC236}">
+                <a16:creationId xmlns:a16="http://schemas.microsoft.com/office/drawing/2014/main" id="{A00D6C60-AE87-4EE9-A4CE-124E3820F296}"/>
+              </a:ext>
+            </a:extLst>
+          </p:cNvPr>
+          <p:cNvSpPr/>
+          <p:nvPr/>
+        </p:nvSpPr>
+        <p:spPr>
+          <a:xfrm>
+            <a:off x="1351722" y="1232452"/>
+            <a:ext cx="9687339" cy="4492487"/>
+          </a:xfrm>
+          <a:prstGeom prst="rect">
+            <a:avLst/>
+          </a:prstGeom>
+          <a:solidFill>
+            <a:schemeClr val="accent2"/>
+          </a:solidFill>
+        </p:spPr>
+        <p:style>
+          <a:lnRef idx="2">
+            <a:schemeClr val="accent1">
+              <a:shade val="50000"/>
+            </a:schemeClr>
+          </a:lnRef>
+          <a:fillRef idx="1">
+            <a:schemeClr val="accent1"/>
+          </a:fillRef>
+          <a:effectRef idx="0">
+            <a:schemeClr val="accent1"/>
+          </a:effectRef>
+          <a:fontRef idx="minor">
+            <a:schemeClr val="lt1"/>
+          </a:fontRef>
+        </p:style>
+        <p:txBody>
+          <a:bodyPr rtlCol="0" anchor="ctr"/>
+          <a:lstStyle/>
+          <a:p>
+            <a:pPr algn="ctr"/>
+            <a:r>
+              <a:rPr lang="en-US" dirty="0" err="1"/>
+              <a:t>RandomQuoteMachine</a:t>
+            </a:r>
+            <a:endParaRPr lang="en-US" dirty="0"/>
+          </a:p>
+        </p:txBody>
+      </p:sp>
+      <p:sp>
+        <p:nvSpPr>
+          <p:cNvPr id="3" name="Rectangle 2">
+            <a:extLst>
+              <a:ext uri="{FF2B5EF4-FFF2-40B4-BE49-F238E27FC236}">
+                <a16:creationId xmlns:a16="http://schemas.microsoft.com/office/drawing/2014/main" id="{C41E3F42-AB82-46DB-B624-D510056A710F}"/>
+              </a:ext>
+            </a:extLst>
+          </p:cNvPr>
+          <p:cNvSpPr/>
+          <p:nvPr/>
+        </p:nvSpPr>
+        <p:spPr>
+          <a:xfrm>
+            <a:off x="1868557" y="1683026"/>
+            <a:ext cx="8640417" cy="2623931"/>
+          </a:xfrm>
+          <a:prstGeom prst="rect">
+            <a:avLst/>
+          </a:prstGeom>
+          <a:solidFill>
+            <a:srgbClr val="00B050"/>
+          </a:solidFill>
+        </p:spPr>
+        <p:style>
+          <a:lnRef idx="2">
+            <a:schemeClr val="accent1">
+              <a:shade val="50000"/>
+            </a:schemeClr>
+          </a:lnRef>
+          <a:fillRef idx="1">
+            <a:schemeClr val="accent1"/>
+          </a:fillRef>
+          <a:effectRef idx="0">
+            <a:schemeClr val="accent1"/>
+          </a:effectRef>
+          <a:fontRef idx="minor">
+            <a:schemeClr val="lt1"/>
+          </a:fontRef>
+        </p:style>
+        <p:txBody>
+          <a:bodyPr rtlCol="0" anchor="ctr"/>
+          <a:lstStyle/>
+          <a:p>
+            <a:pPr algn="ctr"/>
+            <a:r>
+              <a:rPr lang="en-US" dirty="0"/>
+              <a:t>Quote</a:t>
+            </a:r>
+          </a:p>
+        </p:txBody>
+      </p:sp>
+      <p:sp>
+        <p:nvSpPr>
+          <p:cNvPr id="8" name="Rectangle 7">
+            <a:extLst>
+              <a:ext uri="{FF2B5EF4-FFF2-40B4-BE49-F238E27FC236}">
+                <a16:creationId xmlns:a16="http://schemas.microsoft.com/office/drawing/2014/main" id="{B918D291-56F5-4417-A40A-5FA6975708C6}"/>
+              </a:ext>
+            </a:extLst>
+          </p:cNvPr>
+          <p:cNvSpPr/>
+          <p:nvPr/>
+        </p:nvSpPr>
+        <p:spPr>
+          <a:xfrm>
+            <a:off x="1868557" y="4412974"/>
+            <a:ext cx="8640417" cy="915772"/>
+          </a:xfrm>
+          <a:prstGeom prst="rect">
+            <a:avLst/>
+          </a:prstGeom>
+          <a:solidFill>
+            <a:srgbClr val="00B050"/>
+          </a:solidFill>
+        </p:spPr>
+        <p:style>
+          <a:lnRef idx="2">
+            <a:schemeClr val="accent1">
+              <a:shade val="50000"/>
+            </a:schemeClr>
+          </a:lnRef>
+          <a:fillRef idx="1">
+            <a:schemeClr val="accent1"/>
+          </a:fillRef>
+          <a:effectRef idx="0">
+            <a:schemeClr val="accent1"/>
+          </a:effectRef>
+          <a:fontRef idx="minor">
+            <a:schemeClr val="lt1"/>
+          </a:fontRef>
+        </p:style>
+        <p:txBody>
+          <a:bodyPr rtlCol="0" anchor="ctr"/>
+          <a:lstStyle/>
+          <a:p>
+            <a:pPr algn="ctr"/>
+            <a:r>
+              <a:rPr lang="en-US" dirty="0"/>
+              <a:t>Buttons</a:t>
+            </a:r>
+          </a:p>
+        </p:txBody>
+      </p:sp>
+      <p:sp>
+        <p:nvSpPr>
+          <p:cNvPr id="5" name="Rectangle 4">
+            <a:extLst>
+              <a:ext uri="{FF2B5EF4-FFF2-40B4-BE49-F238E27FC236}">
+                <a16:creationId xmlns:a16="http://schemas.microsoft.com/office/drawing/2014/main" id="{BA127224-3236-4DBD-85A1-681B91FBC416}"/>
+              </a:ext>
+            </a:extLst>
+          </p:cNvPr>
+          <p:cNvSpPr/>
+          <p:nvPr/>
+        </p:nvSpPr>
+        <p:spPr>
+          <a:xfrm>
+            <a:off x="1988711" y="4519620"/>
+            <a:ext cx="1551934" cy="718931"/>
+          </a:xfrm>
+          <a:prstGeom prst="rect">
+            <a:avLst/>
+          </a:prstGeom>
+          <a:solidFill>
+            <a:srgbClr val="FFC000"/>
+          </a:solidFill>
+        </p:spPr>
+        <p:style>
+          <a:lnRef idx="2">
+            <a:schemeClr val="accent1">
+              <a:shade val="50000"/>
+            </a:schemeClr>
+          </a:lnRef>
+          <a:fillRef idx="1">
+            <a:schemeClr val="accent1"/>
+          </a:fillRef>
+          <a:effectRef idx="0">
+            <a:schemeClr val="accent1"/>
+          </a:effectRef>
+          <a:fontRef idx="minor">
+            <a:schemeClr val="lt1"/>
+          </a:fontRef>
+        </p:style>
+        <p:txBody>
+          <a:bodyPr rtlCol="0" anchor="ctr"/>
+          <a:lstStyle/>
+          <a:p>
+            <a:pPr algn="ctr"/>
+            <a:r>
+              <a:rPr lang="en-US" dirty="0" err="1"/>
+              <a:t>facebook</a:t>
+            </a:r>
+            <a:endParaRPr lang="en-US" dirty="0"/>
+          </a:p>
+        </p:txBody>
+      </p:sp>
+      <p:sp>
+        <p:nvSpPr>
+          <p:cNvPr id="6" name="Rectangle 5">
+            <a:extLst>
+              <a:ext uri="{FF2B5EF4-FFF2-40B4-BE49-F238E27FC236}">
+                <a16:creationId xmlns:a16="http://schemas.microsoft.com/office/drawing/2014/main" id="{5CF7DA36-1534-421E-B8E4-8B2C977D01CF}"/>
+              </a:ext>
+            </a:extLst>
+          </p:cNvPr>
+          <p:cNvSpPr/>
+          <p:nvPr/>
+        </p:nvSpPr>
+        <p:spPr>
+          <a:xfrm>
+            <a:off x="3723862" y="4519620"/>
+            <a:ext cx="1551934" cy="718931"/>
+          </a:xfrm>
+          <a:prstGeom prst="rect">
+            <a:avLst/>
+          </a:prstGeom>
+          <a:solidFill>
+            <a:srgbClr val="FFC000"/>
+          </a:solidFill>
+        </p:spPr>
+        <p:style>
+          <a:lnRef idx="2">
+            <a:schemeClr val="accent1">
+              <a:shade val="50000"/>
+            </a:schemeClr>
+          </a:lnRef>
+          <a:fillRef idx="1">
+            <a:schemeClr val="accent1"/>
+          </a:fillRef>
+          <a:effectRef idx="0">
+            <a:schemeClr val="accent1"/>
+          </a:effectRef>
+          <a:fontRef idx="minor">
+            <a:schemeClr val="lt1"/>
+          </a:fontRef>
+        </p:style>
+        <p:txBody>
+          <a:bodyPr rtlCol="0" anchor="ctr"/>
+          <a:lstStyle/>
+          <a:p>
+            <a:pPr algn="ctr"/>
+            <a:r>
+              <a:rPr lang="en-US" dirty="0"/>
+              <a:t>twitter</a:t>
+            </a:r>
+          </a:p>
+        </p:txBody>
+      </p:sp>
+      <p:sp>
+        <p:nvSpPr>
+          <p:cNvPr id="7" name="Rectangle 6">
+            <a:extLst>
+              <a:ext uri="{FF2B5EF4-FFF2-40B4-BE49-F238E27FC236}">
+                <a16:creationId xmlns:a16="http://schemas.microsoft.com/office/drawing/2014/main" id="{E3CA4A37-0AB9-4219-90ED-D7360A046457}"/>
+              </a:ext>
+            </a:extLst>
+          </p:cNvPr>
+          <p:cNvSpPr/>
+          <p:nvPr/>
+        </p:nvSpPr>
+        <p:spPr>
+          <a:xfrm>
+            <a:off x="8846591" y="4519620"/>
+            <a:ext cx="1551934" cy="718931"/>
+          </a:xfrm>
+          <a:prstGeom prst="rect">
+            <a:avLst/>
+          </a:prstGeom>
+          <a:solidFill>
+            <a:srgbClr val="FFC000"/>
+          </a:solidFill>
+        </p:spPr>
+        <p:style>
+          <a:lnRef idx="2">
+            <a:schemeClr val="accent1">
+              <a:shade val="50000"/>
+            </a:schemeClr>
+          </a:lnRef>
+          <a:fillRef idx="1">
+            <a:schemeClr val="accent1"/>
+          </a:fillRef>
+          <a:effectRef idx="0">
+            <a:schemeClr val="accent1"/>
+          </a:effectRef>
+          <a:fontRef idx="minor">
+            <a:schemeClr val="lt1"/>
+          </a:fontRef>
+        </p:style>
+        <p:txBody>
+          <a:bodyPr rtlCol="0" anchor="ctr"/>
+          <a:lstStyle/>
+          <a:p>
+            <a:pPr algn="ctr"/>
+            <a:r>
+              <a:rPr lang="en-US" dirty="0" err="1"/>
+              <a:t>Btn</a:t>
+            </a:r>
+            <a:r>
+              <a:rPr lang="en-US" dirty="0"/>
+              <a:t>-quote</a:t>
+            </a:r>
+          </a:p>
+        </p:txBody>
+      </p:sp>
+    </p:spTree>
+    <p:extLst>
+      <p:ext uri="{BB962C8B-B14F-4D97-AF65-F5344CB8AC3E}">
+        <p14:creationId xmlns:p14="http://schemas.microsoft.com/office/powerpoint/2010/main" val="1388482647"/>
       </p:ext>
     </p:extLst>
   </p:cSld>

</xml_diff>